<commit_message>
Added examples of pie chart, ring chart, bubble chart and stacked bar chart
</commit_message>
<xml_diff>
--- a/BubbleChart/PowerPointBubble.pptx
+++ b/BubbleChart/PowerPointBubble.pptx
@@ -6,6 +6,7 @@
   </p:sldMasterIdLst>
   <p:sldIdLst>
     <p:sldId id="256" r:id="rId6"/>
+    <p:sldId id="257" r:id="rId7"/>
   </p:sldIdLst>
   <p:sldSz cx="9144000" cy="6858000" type="screen4x3"/>
   <p:notesSz cx="6858000" cy="9144000"/>
@@ -3059,6 +3060,560 @@
           <a:chExt cx="0" cy="0"/>
         </a:xfrm>
       </p:grpSpPr>
+      <p:sp>
+        <p:nvSpPr>
+          <p:cNvPr name="TextBox 1" id="2"/>
+          <p:cNvSpPr txBox="true"/>
+          <p:nvPr/>
+        </p:nvSpPr>
+        <p:spPr>
+          <a:xfrm>
+            <a:off x="3175000" y="63500"/>
+            <a:ext cx="1905000" cy="317500"/>
+          </a:xfrm>
+          <a:prstGeom prst="rect">
+            <a:avLst/>
+          </a:prstGeom>
+        </p:spPr>
+        <p:txBody>
+          <a:bodyPr/>
+          <a:lstStyle/>
+          <a:p>
+            <a:pPr algn="ctr"/>
+            <a:r>
+              <a:rPr lang="en-US" sz="2400">
+                <a:solidFill>
+                  <a:srgbClr val="000000"/>
+                </a:solidFill>
+              </a:rPr>
+              <a:t>Model 1</a:t>
+            </a:r>
+          </a:p>
+        </p:txBody>
+      </p:sp>
+      <p:pic>
+        <p:nvPicPr>
+          <p:cNvPr name="Picture 2" id="3"/>
+          <p:cNvPicPr>
+            <a:picLocks noChangeAspect="true"/>
+          </p:cNvPicPr>
+          <p:nvPr/>
+        </p:nvPicPr>
+        <p:blipFill>
+          <a:blip r:embed="rId2"/>
+          <a:stretch>
+            <a:fillRect/>
+          </a:stretch>
+        </p:blipFill>
+        <p:spPr>
+          <a:xfrm>
+            <a:off x="4572000" y="444500"/>
+            <a:ext cx="4267200" cy="2819400"/>
+          </a:xfrm>
+          <a:prstGeom prst="rect">
+            <a:avLst/>
+          </a:prstGeom>
+        </p:spPr>
+      </p:pic>
+      <p:pic>
+        <p:nvPicPr>
+          <p:cNvPr name="Picture 3" id="4"/>
+          <p:cNvPicPr>
+            <a:picLocks noChangeAspect="true"/>
+          </p:cNvPicPr>
+          <p:nvPr/>
+        </p:nvPicPr>
+        <p:blipFill>
+          <a:blip r:embed="rId3"/>
+          <a:stretch>
+            <a:fillRect/>
+          </a:stretch>
+        </p:blipFill>
+        <p:spPr>
+          <a:xfrm>
+            <a:off x="444500" y="2984500"/>
+            <a:ext cx="2514600" cy="2514600"/>
+          </a:xfrm>
+          <a:prstGeom prst="rect">
+            <a:avLst/>
+          </a:prstGeom>
+        </p:spPr>
+      </p:pic>
+      <p:pic>
+        <p:nvPicPr>
+          <p:cNvPr name="Picture 4" id="5"/>
+          <p:cNvPicPr>
+            <a:picLocks noChangeAspect="true"/>
+          </p:cNvPicPr>
+          <p:nvPr/>
+        </p:nvPicPr>
+        <p:blipFill>
+          <a:blip r:embed="rId4"/>
+          <a:stretch>
+            <a:fillRect/>
+          </a:stretch>
+        </p:blipFill>
+        <p:spPr>
+          <a:xfrm>
+            <a:off x="4572000" y="2984500"/>
+            <a:ext cx="2514600" cy="2514600"/>
+          </a:xfrm>
+          <a:prstGeom prst="rect">
+            <a:avLst/>
+          </a:prstGeom>
+        </p:spPr>
+      </p:pic>
+      <p:pic>
+        <p:nvPicPr>
+          <p:cNvPr name="Picture 5" id="6"/>
+          <p:cNvPicPr>
+            <a:picLocks noChangeAspect="true"/>
+          </p:cNvPicPr>
+          <p:nvPr/>
+        </p:nvPicPr>
+        <p:blipFill>
+          <a:blip r:embed="rId5"/>
+          <a:stretch>
+            <a:fillRect/>
+          </a:stretch>
+        </p:blipFill>
+        <p:spPr>
+          <a:xfrm>
+            <a:off x="444500" y="5524500"/>
+            <a:ext cx="2667000" cy="1143000"/>
+          </a:xfrm>
+          <a:prstGeom prst="rect">
+            <a:avLst/>
+          </a:prstGeom>
+        </p:spPr>
+      </p:pic>
+      <p:pic>
+        <p:nvPicPr>
+          <p:cNvPr name="Picture 6" id="7"/>
+          <p:cNvPicPr>
+            <a:picLocks noChangeAspect="true"/>
+          </p:cNvPicPr>
+          <p:nvPr/>
+        </p:nvPicPr>
+        <p:blipFill>
+          <a:blip r:embed="rId6"/>
+          <a:stretch>
+            <a:fillRect/>
+          </a:stretch>
+        </p:blipFill>
+        <p:spPr>
+          <a:xfrm>
+            <a:off x="4572000" y="5524500"/>
+            <a:ext cx="2667000" cy="1143000"/>
+          </a:xfrm>
+          <a:prstGeom prst="rect">
+            <a:avLst/>
+          </a:prstGeom>
+        </p:spPr>
+      </p:pic>
+      <p:graphicFrame>
+        <p:nvGraphicFramePr>
+          <p:cNvPr name="Table 7" id="8"/>
+          <p:cNvGraphicFramePr>
+            <a:graphicFrameLocks noGrp="true"/>
+          </p:cNvGraphicFramePr>
+          <p:nvPr/>
+        </p:nvGraphicFramePr>
+        <p:xfrm>
+          <a:off x="317500" y="635000"/>
+          <a:ext cx="3302000" cy="1270000"/>
+        </p:xfrm>
+        <a:graphic>
+          <a:graphicData uri="http://schemas.openxmlformats.org/drawingml/2006/table">
+            <a:tbl>
+              <a:tblPr/>
+              <a:tblGrid>
+                <a:gridCol w="1905000"/>
+                <a:gridCol w="1905000"/>
+                <a:gridCol w="1905000"/>
+              </a:tblGrid>
+              <a:tr h="190500">
+                <a:tc>
+                  <a:txBody>
+                    <a:bodyPr/>
+                    <a:lstStyle/>
+                    <a:p>
+                      <a:pPr algn="ctr"/>
+                      <a:r>
+                        <a:rPr lang="en-US" b="true" sz="1000"/>
+                        <a:t>Area</a:t>
+                      </a:r>
+                    </a:p>
+                  </a:txBody>
+                  <a:tcPr>
+                    <a:lnL>
+                      <a:noFill/>
+                    </a:lnL>
+                    <a:lnR>
+                      <a:noFill/>
+                    </a:lnR>
+                    <a:lnT>
+                      <a:noFill/>
+                    </a:lnT>
+                    <a:lnB>
+                      <a:noFill/>
+                    </a:lnB>
+                    <a:solidFill>
+                      <a:srgbClr val="4F81BD"/>
+                    </a:solidFill>
+                  </a:tcPr>
+                </a:tc>
+                <a:tc>
+                  <a:txBody>
+                    <a:bodyPr/>
+                    <a:lstStyle/>
+                    <a:p>
+                      <a:pPr algn="ctr"/>
+                      <a:r>
+                        <a:rPr lang="en-US" b="true" sz="1000"/>
+                        <a:t>Robustness</a:t>
+                      </a:r>
+                    </a:p>
+                  </a:txBody>
+                  <a:tcPr>
+                    <a:lnL>
+                      <a:noFill/>
+                    </a:lnL>
+                    <a:lnR>
+                      <a:noFill/>
+                    </a:lnR>
+                    <a:lnT>
+                      <a:noFill/>
+                    </a:lnT>
+                    <a:lnB>
+                      <a:noFill/>
+                    </a:lnB>
+                    <a:solidFill>
+                      <a:srgbClr val="4F81BD"/>
+                    </a:solidFill>
+                  </a:tcPr>
+                </a:tc>
+                <a:tc>
+                  <a:txBody>
+                    <a:bodyPr/>
+                    <a:lstStyle/>
+                    <a:p>
+                      <a:pPr algn="ctr"/>
+                      <a:r>
+                        <a:rPr lang="en-US" b="true" sz="1000"/>
+                        <a:t>Conformity</a:t>
+                      </a:r>
+                    </a:p>
+                  </a:txBody>
+                  <a:tcPr>
+                    <a:lnL>
+                      <a:noFill/>
+                    </a:lnL>
+                    <a:lnR>
+                      <a:noFill/>
+                    </a:lnR>
+                    <a:lnT>
+                      <a:noFill/>
+                    </a:lnT>
+                    <a:lnB>
+                      <a:noFill/>
+                    </a:lnB>
+                    <a:solidFill>
+                      <a:srgbClr val="4F81BD"/>
+                    </a:solidFill>
+                  </a:tcPr>
+                </a:tc>
+              </a:tr>
+              <a:tr h="190500">
+                <a:tc>
+                  <a:txBody>
+                    <a:bodyPr/>
+                    <a:lstStyle/>
+                    <a:p>
+                      <a:r>
+                        <a:rPr lang="en-US" sz="1000"/>
+                        <a:t>AA</a:t>
+                      </a:r>
+                      <a:br>
+                        <a:rPr lang="en-US" sz="1000"/>
+                      </a:br>
+                      <a:r>
+                        <a:rPr lang="en-US" sz="600"/>
+                        <a:t>Robustness</a:t>
+                      </a:r>
+                    </a:p>
+                  </a:txBody>
+                  <a:tcPr>
+                    <a:lnL>
+                      <a:noFill/>
+                    </a:lnL>
+                    <a:lnR>
+                      <a:noFill/>
+                    </a:lnR>
+                    <a:lnT>
+                      <a:noFill/>
+                    </a:lnT>
+                    <a:lnB>
+                      <a:noFill/>
+                    </a:lnB>
+                  </a:tcPr>
+                </a:tc>
+                <a:tc>
+                  <a:txBody>
+                    <a:bodyPr/>
+                    <a:lstStyle/>
+                    <a:p>
+                      <a:r>
+                        <a:rPr lang="en-US" sz="1000"/>
+                        <a:t>4.1</a:t>
+                      </a:r>
+                    </a:p>
+                  </a:txBody>
+                  <a:tcPr>
+                    <a:lnL>
+                      <a:noFill/>
+                    </a:lnL>
+                    <a:lnR>
+                      <a:noFill/>
+                    </a:lnR>
+                    <a:lnT>
+                      <a:noFill/>
+                    </a:lnT>
+                    <a:lnB>
+                      <a:noFill/>
+                    </a:lnB>
+                  </a:tcPr>
+                </a:tc>
+                <a:tc>
+                  <a:txBody>
+                    <a:bodyPr/>
+                    <a:lstStyle/>
+                    <a:p>
+                      <a:r>
+                        <a:rPr lang="en-US" sz="1000"/>
+                        <a:t>99.81</a:t>
+                      </a:r>
+                    </a:p>
+                  </a:txBody>
+                  <a:tcPr>
+                    <a:lnL>
+                      <a:noFill/>
+                    </a:lnL>
+                    <a:lnR>
+                      <a:noFill/>
+                    </a:lnR>
+                    <a:lnT>
+                      <a:noFill/>
+                    </a:lnT>
+                    <a:lnB>
+                      <a:noFill/>
+                    </a:lnB>
+                  </a:tcPr>
+                </a:tc>
+              </a:tr>
+              <a:tr h="190500">
+                <a:tc>
+                  <a:txBody>
+                    <a:bodyPr/>
+                    <a:lstStyle/>
+                    <a:p>
+                      <a:r>
+                        <a:rPr lang="en-US" sz="1000"/>
+                        <a:t>GI</a:t>
+                      </a:r>
+                      <a:br>
+                        <a:rPr lang="en-US" sz="1000"/>
+                      </a:br>
+                      <a:r>
+                        <a:rPr lang="en-US" sz="600"/>
+                        <a:t>Robustness</a:t>
+                      </a:r>
+                    </a:p>
+                  </a:txBody>
+                  <a:tcPr>
+                    <a:lnL>
+                      <a:noFill/>
+                    </a:lnL>
+                    <a:lnR>
+                      <a:noFill/>
+                    </a:lnR>
+                    <a:lnT>
+                      <a:noFill/>
+                    </a:lnT>
+                    <a:lnB>
+                      <a:noFill/>
+                    </a:lnB>
+                  </a:tcPr>
+                </a:tc>
+                <a:tc>
+                  <a:txBody>
+                    <a:bodyPr/>
+                    <a:lstStyle/>
+                    <a:p>
+                      <a:r>
+                        <a:rPr lang="en-US" sz="1000"/>
+                        <a:t>2.7</a:t>
+                      </a:r>
+                    </a:p>
+                  </a:txBody>
+                  <a:tcPr>
+                    <a:lnL>
+                      <a:noFill/>
+                    </a:lnL>
+                    <a:lnR>
+                      <a:noFill/>
+                    </a:lnR>
+                    <a:lnT>
+                      <a:noFill/>
+                    </a:lnT>
+                    <a:lnB>
+                      <a:noFill/>
+                    </a:lnB>
+                  </a:tcPr>
+                </a:tc>
+                <a:tc>
+                  <a:txBody>
+                    <a:bodyPr/>
+                    <a:lstStyle/>
+                    <a:p>
+                      <a:r>
+                        <a:rPr lang="en-US" sz="1000"/>
+                        <a:t>100</a:t>
+                      </a:r>
+                    </a:p>
+                  </a:txBody>
+                  <a:tcPr>
+                    <a:lnL>
+                      <a:noFill/>
+                    </a:lnL>
+                    <a:lnR>
+                      <a:noFill/>
+                    </a:lnR>
+                    <a:lnT>
+                      <a:noFill/>
+                    </a:lnT>
+                    <a:lnB>
+                      <a:noFill/>
+                    </a:lnB>
+                  </a:tcPr>
+                </a:tc>
+              </a:tr>
+              <a:tr h="190500">
+                <a:tc>
+                  <a:txBody>
+                    <a:bodyPr/>
+                    <a:lstStyle/>
+                    <a:p>
+                      <a:r>
+                        <a:rPr lang="en-US" sz="1000"/>
+                        <a:t>GT</a:t>
+                      </a:r>
+                      <a:br>
+                        <a:rPr lang="en-US" sz="1000"/>
+                      </a:br>
+                      <a:r>
+                        <a:rPr lang="en-US" sz="600"/>
+                        <a:t>Robustness</a:t>
+                      </a:r>
+                    </a:p>
+                  </a:txBody>
+                  <a:tcPr>
+                    <a:lnL>
+                      <a:noFill/>
+                    </a:lnL>
+                    <a:lnR>
+                      <a:noFill/>
+                    </a:lnR>
+                    <a:lnT>
+                      <a:noFill/>
+                    </a:lnT>
+                    <a:lnB>
+                      <a:noFill/>
+                    </a:lnB>
+                  </a:tcPr>
+                </a:tc>
+                <a:tc>
+                  <a:txBody>
+                    <a:bodyPr/>
+                    <a:lstStyle/>
+                    <a:p>
+                      <a:r>
+                        <a:rPr lang="en-US" sz="1000"/>
+                        <a:t>4.1</a:t>
+                      </a:r>
+                    </a:p>
+                  </a:txBody>
+                  <a:tcPr>
+                    <a:lnL>
+                      <a:noFill/>
+                    </a:lnL>
+                    <a:lnR>
+                      <a:noFill/>
+                    </a:lnR>
+                    <a:lnT>
+                      <a:noFill/>
+                    </a:lnT>
+                    <a:lnB>
+                      <a:noFill/>
+                    </a:lnB>
+                  </a:tcPr>
+                </a:tc>
+                <a:tc>
+                  <a:txBody>
+                    <a:bodyPr/>
+                    <a:lstStyle/>
+                    <a:p>
+                      <a:r>
+                        <a:rPr lang="en-US" sz="1000"/>
+                        <a:t>100</a:t>
+                      </a:r>
+                    </a:p>
+                  </a:txBody>
+                  <a:tcPr>
+                    <a:lnL>
+                      <a:noFill/>
+                    </a:lnL>
+                    <a:lnR>
+                      <a:noFill/>
+                    </a:lnR>
+                    <a:lnT>
+                      <a:noFill/>
+                    </a:lnT>
+                    <a:lnB>
+                      <a:noFill/>
+                    </a:lnB>
+                  </a:tcPr>
+                </a:tc>
+              </a:tr>
+            </a:tbl>
+          </a:graphicData>
+        </a:graphic>
+      </p:graphicFrame>
+    </p:spTree>
+  </p:cSld>
+  <p:clrMapOvr>
+    <a:masterClrMapping/>
+  </p:clrMapOvr>
+</p:sld>
+</file>
+
+<file path=ppt/slides/slide2.xml><?xml version="1.0" encoding="utf-8"?>
+<p:sld xmlns:p="http://schemas.openxmlformats.org/presentationml/2006/main" xmlns:a="http://schemas.openxmlformats.org/drawingml/2006/main" xmlns:r="http://schemas.openxmlformats.org/officeDocument/2006/relationships">
+  <p:cSld>
+    <p:spTree>
+      <p:nvGrpSpPr>
+        <p:cNvPr id="1" name=""/>
+        <p:cNvGrpSpPr/>
+        <p:nvPr/>
+      </p:nvGrpSpPr>
+      <p:grpSpPr>
+        <a:xfrm>
+          <a:off x="0" y="0"/>
+          <a:ext cx="0" cy="0"/>
+          <a:chOff x="0" y="0"/>
+          <a:chExt cx="0" cy="0"/>
+        </a:xfrm>
+      </p:grpSpPr>
       <p:pic>
         <p:nvPicPr>
           <p:cNvPr name="Picture 1" id="2"/>
@@ -3075,14 +3630,582 @@
         </p:blipFill>
         <p:spPr>
           <a:xfrm>
-            <a:off x="0" y="0"/>
-            <a:ext cx="7112000" cy="4699000"/>
+            <a:off x="444500" y="3429000"/>
+            <a:ext cx="1524000" cy="1524000"/>
           </a:xfrm>
           <a:prstGeom prst="rect">
             <a:avLst/>
           </a:prstGeom>
         </p:spPr>
       </p:pic>
+      <p:graphicFrame>
+        <p:nvGraphicFramePr>
+          <p:cNvPr name="Table 2" id="3"/>
+          <p:cNvGraphicFramePr>
+            <a:graphicFrameLocks noGrp="true"/>
+          </p:cNvGraphicFramePr>
+          <p:nvPr/>
+        </p:nvGraphicFramePr>
+        <p:xfrm>
+          <a:off x="317500" y="635000"/>
+          <a:ext cx="3302000" cy="1270000"/>
+        </p:xfrm>
+        <a:graphic>
+          <a:graphicData uri="http://schemas.openxmlformats.org/drawingml/2006/table">
+            <a:tbl>
+              <a:tblPr/>
+              <a:tblGrid>
+                <a:gridCol w="1905000"/>
+                <a:gridCol w="1905000"/>
+                <a:gridCol w="1905000"/>
+              </a:tblGrid>
+              <a:tr h="190500">
+                <a:tc>
+                  <a:txBody>
+                    <a:bodyPr/>
+                    <a:lstStyle/>
+                    <a:p>
+                      <a:pPr algn="ctr"/>
+                      <a:r>
+                        <a:rPr lang="en-US" b="true" sz="1000"/>
+                        <a:t>Area</a:t>
+                      </a:r>
+                    </a:p>
+                  </a:txBody>
+                  <a:tcPr>
+                    <a:lnL>
+                      <a:noFill/>
+                    </a:lnL>
+                    <a:lnR w="25400" cmpd="sng" algn="ctr" cap="flat">
+                      <a:solidFill>
+                        <a:srgbClr val="FFFFFF"/>
+                      </a:solidFill>
+                      <a:prstDash val="solid"/>
+                      <a:round/>
+                      <a:headEnd type="none" w="med" len="med"/>
+                      <a:tailEnd type="none" w="med" len="med"/>
+                    </a:lnR>
+                    <a:lnT>
+                      <a:noFill/>
+                    </a:lnT>
+                    <a:lnB>
+                      <a:noFill/>
+                    </a:lnB>
+                    <a:solidFill>
+                      <a:srgbClr val="4F81BD"/>
+                    </a:solidFill>
+                  </a:tcPr>
+                </a:tc>
+                <a:tc>
+                  <a:txBody>
+                    <a:bodyPr/>
+                    <a:lstStyle/>
+                    <a:p>
+                      <a:pPr algn="ctr"/>
+                      <a:r>
+                        <a:rPr lang="en-US" b="true" sz="1000"/>
+                        <a:t>Robustness</a:t>
+                      </a:r>
+                    </a:p>
+                  </a:txBody>
+                  <a:tcPr>
+                    <a:lnL>
+                      <a:noFill/>
+                    </a:lnL>
+                    <a:lnR w="25400" cmpd="sng" algn="ctr" cap="flat">
+                      <a:solidFill>
+                        <a:srgbClr val="FFFFFF"/>
+                      </a:solidFill>
+                      <a:prstDash val="solid"/>
+                      <a:round/>
+                      <a:headEnd type="none" w="med" len="med"/>
+                      <a:tailEnd type="none" w="med" len="med"/>
+                    </a:lnR>
+                    <a:lnT>
+                      <a:noFill/>
+                    </a:lnT>
+                    <a:lnB>
+                      <a:noFill/>
+                    </a:lnB>
+                    <a:solidFill>
+                      <a:srgbClr val="4F81BD"/>
+                    </a:solidFill>
+                  </a:tcPr>
+                </a:tc>
+                <a:tc>
+                  <a:txBody>
+                    <a:bodyPr/>
+                    <a:lstStyle/>
+                    <a:p>
+                      <a:pPr algn="ctr"/>
+                      <a:r>
+                        <a:rPr lang="en-US" b="true" sz="1000"/>
+                        <a:t>Conformity</a:t>
+                      </a:r>
+                    </a:p>
+                  </a:txBody>
+                  <a:tcPr>
+                    <a:lnL>
+                      <a:noFill/>
+                    </a:lnL>
+                    <a:lnR w="25400" cmpd="sng" algn="ctr" cap="flat">
+                      <a:solidFill>
+                        <a:srgbClr val="FFFFFF"/>
+                      </a:solidFill>
+                      <a:prstDash val="solid"/>
+                      <a:round/>
+                      <a:headEnd type="none" w="med" len="med"/>
+                      <a:tailEnd type="none" w="med" len="med"/>
+                    </a:lnR>
+                    <a:lnT>
+                      <a:noFill/>
+                    </a:lnT>
+                    <a:lnB>
+                      <a:noFill/>
+                    </a:lnB>
+                    <a:solidFill>
+                      <a:srgbClr val="4F81BD"/>
+                    </a:solidFill>
+                  </a:tcPr>
+                </a:tc>
+              </a:tr>
+              <a:tr h="190500">
+                <a:tc>
+                  <a:txBody>
+                    <a:bodyPr/>
+                    <a:lstStyle/>
+                    <a:p>
+                      <a:r>
+                        <a:rPr lang="en-US" sz="1000" b="true"/>
+                        <a:t>90</a:t>
+                      </a:r>
+                      <a:r>
+                        <a:rPr lang="en-US" sz="1000"/>
+                        <a:t> CONTROLS</a:t>
+                      </a:r>
+                      <a:br>
+                        <a:rPr lang="en-US" sz="1000"/>
+                      </a:br>
+                      <a:br>
+                        <a:rPr lang="en-US" sz="1000"/>
+                      </a:br>
+                      <a:r>
+                        <a:rPr lang="en-US" sz="800"/>
+                        <a:t>Robustness</a:t>
+                      </a:r>
+                      <a:br>
+                        <a:rPr lang="en-US" sz="800"/>
+                      </a:br>
+                      <a:r>
+                        <a:rPr lang="en-US" sz="1000" b="true"/>
+                        <a:t>1.3</a:t>
+                      </a:r>
+                      <a:br>
+                        <a:rPr lang="en-US" sz="1000" b="true"/>
+                      </a:br>
+                      <a:br>
+                        <a:rPr lang="en-US" sz="1000" b="true"/>
+                      </a:br>
+                      <a:r>
+                        <a:rPr lang="en-US" sz="800"/>
+                        <a:t>Conformity</a:t>
+                      </a:r>
+                      <a:br>
+                        <a:rPr lang="en-US" sz="800"/>
+                      </a:br>
+                      <a:r>
+                        <a:rPr lang="en-US" sz="1000" b="true"/>
+                        <a:t>100%</a:t>
+                      </a:r>
+                      <a:br>
+                        <a:rPr lang="en-US" sz="1000" b="true"/>
+                      </a:br>
+                      <a:br>
+                        <a:rPr lang="en-US" sz="1000" b="true"/>
+                      </a:br>
+                    </a:p>
+                  </a:txBody>
+                  <a:tcPr>
+                    <a:lnL>
+                      <a:noFill/>
+                    </a:lnL>
+                    <a:lnR w="25400" cmpd="sng" algn="ctr" cap="flat">
+                      <a:solidFill>
+                        <a:srgbClr val="FFFFFF"/>
+                      </a:solidFill>
+                      <a:prstDash val="solid"/>
+                      <a:round/>
+                      <a:headEnd type="none" w="med" len="med"/>
+                      <a:tailEnd type="none" w="med" len="med"/>
+                    </a:lnR>
+                    <a:lnT>
+                      <a:noFill/>
+                    </a:lnT>
+                    <a:lnB w="19050" cmpd="sng" algn="ctr" cap="flat">
+                      <a:solidFill>
+                        <a:srgbClr val="FFFFFF"/>
+                      </a:solidFill>
+                      <a:prstDash val="solid"/>
+                      <a:round/>
+                      <a:headEnd type="none" w="med" len="med"/>
+                      <a:tailEnd type="none" w="med" len="med"/>
+                    </a:lnB>
+                    <a:solidFill>
+                      <a:srgbClr val="FBF8B9"/>
+                    </a:solidFill>
+                  </a:tcPr>
+                </a:tc>
+                <a:tc>
+                  <a:txBody>
+                    <a:bodyPr/>
+                    <a:lstStyle/>
+                    <a:p>
+                      <a:r>
+                        <a:rPr lang="en-US" sz="1000"/>
+                        <a:t>99</a:t>
+                      </a:r>
+                    </a:p>
+                  </a:txBody>
+                  <a:tcPr>
+                    <a:lnL>
+                      <a:noFill/>
+                    </a:lnL>
+                    <a:lnR w="25400" cmpd="sng" algn="ctr" cap="flat">
+                      <a:solidFill>
+                        <a:srgbClr val="FFFFFF"/>
+                      </a:solidFill>
+                      <a:prstDash val="solid"/>
+                      <a:round/>
+                      <a:headEnd type="none" w="med" len="med"/>
+                      <a:tailEnd type="none" w="med" len="med"/>
+                    </a:lnR>
+                    <a:lnT>
+                      <a:noFill/>
+                    </a:lnT>
+                    <a:lnB w="12700" cmpd="sng" algn="ctr" cap="flat">
+                      <a:solidFill>
+                        <a:srgbClr val="FFFFFF"/>
+                      </a:solidFill>
+                      <a:prstDash val="solid"/>
+                      <a:round/>
+                      <a:headEnd type="none" w="med" len="med"/>
+                      <a:tailEnd type="none" w="med" len="med"/>
+                    </a:lnB>
+                    <a:solidFill>
+                      <a:srgbClr val="FBF8B9"/>
+                    </a:solidFill>
+                  </a:tcPr>
+                </a:tc>
+                <a:tc>
+                  <a:txBody>
+                    <a:bodyPr/>
+                    <a:lstStyle/>
+                    <a:p>
+                      <a:r>
+                        <a:rPr lang="en-US" sz="1000"/>
+                        <a:t>78.2</a:t>
+                      </a:r>
+                    </a:p>
+                  </a:txBody>
+                  <a:tcPr>
+                    <a:lnL>
+                      <a:noFill/>
+                    </a:lnL>
+                    <a:lnR w="25400" cmpd="sng" algn="ctr" cap="flat">
+                      <a:solidFill>
+                        <a:srgbClr val="FFFFFF"/>
+                      </a:solidFill>
+                      <a:prstDash val="solid"/>
+                      <a:round/>
+                      <a:headEnd type="none" w="med" len="med"/>
+                      <a:tailEnd type="none" w="med" len="med"/>
+                    </a:lnR>
+                    <a:lnT>
+                      <a:noFill/>
+                    </a:lnT>
+                    <a:lnB w="12700" cmpd="sng" algn="ctr" cap="flat">
+                      <a:solidFill>
+                        <a:srgbClr val="FFFFFF"/>
+                      </a:solidFill>
+                      <a:prstDash val="solid"/>
+                      <a:round/>
+                      <a:headEnd type="none" w="med" len="med"/>
+                      <a:tailEnd type="none" w="med" len="med"/>
+                    </a:lnB>
+                    <a:solidFill>
+                      <a:srgbClr val="FBF8B9"/>
+                    </a:solidFill>
+                  </a:tcPr>
+                </a:tc>
+              </a:tr>
+              <a:tr h="190500">
+                <a:tc>
+                  <a:txBody>
+                    <a:bodyPr/>
+                    <a:lstStyle/>
+                    <a:p>
+                      <a:r>
+                        <a:rPr lang="en-US" sz="1000" b="true"/>
+                        <a:t>90</a:t>
+                      </a:r>
+                      <a:r>
+                        <a:rPr lang="en-US" sz="1000"/>
+                        <a:t> CONTROLS</a:t>
+                      </a:r>
+                      <a:br>
+                        <a:rPr lang="en-US" sz="1000"/>
+                      </a:br>
+                    </a:p>
+                  </a:txBody>
+                  <a:tcPr>
+                    <a:lnL>
+                      <a:noFill/>
+                    </a:lnL>
+                    <a:lnR w="25400" cmpd="sng" algn="ctr" cap="flat">
+                      <a:solidFill>
+                        <a:srgbClr val="FFFFFF"/>
+                      </a:solidFill>
+                      <a:prstDash val="solid"/>
+                      <a:round/>
+                      <a:headEnd type="none" w="med" len="med"/>
+                      <a:tailEnd type="none" w="med" len="med"/>
+                    </a:lnR>
+                    <a:lnT>
+                      <a:noFill/>
+                    </a:lnT>
+                    <a:lnB w="19050" cmpd="sng" algn="ctr" cap="flat">
+                      <a:solidFill>
+                        <a:srgbClr val="FFFFFF"/>
+                      </a:solidFill>
+                      <a:prstDash val="solid"/>
+                      <a:round/>
+                      <a:headEnd type="none" w="med" len="med"/>
+                      <a:tailEnd type="none" w="med" len="med"/>
+                    </a:lnB>
+                    <a:solidFill>
+                      <a:srgbClr val="FBF8B9"/>
+                    </a:solidFill>
+                  </a:tcPr>
+                </a:tc>
+                <a:tc>
+                  <a:txBody>
+                    <a:bodyPr/>
+                    <a:lstStyle/>
+                    <a:p>
+                      <a:r>
+                        <a:rPr lang="en-US" sz="1000"/>
+                        <a:t>99</a:t>
+                      </a:r>
+                    </a:p>
+                  </a:txBody>
+                  <a:tcPr>
+                    <a:lnL>
+                      <a:noFill/>
+                    </a:lnL>
+                    <a:lnR w="25400" cmpd="sng" algn="ctr" cap="flat">
+                      <a:solidFill>
+                        <a:srgbClr val="FFFFFF"/>
+                      </a:solidFill>
+                      <a:prstDash val="solid"/>
+                      <a:round/>
+                      <a:headEnd type="none" w="med" len="med"/>
+                      <a:tailEnd type="none" w="med" len="med"/>
+                    </a:lnR>
+                    <a:lnT>
+                      <a:noFill/>
+                    </a:lnT>
+                    <a:lnB w="12700" cmpd="sng" algn="ctr" cap="flat">
+                      <a:solidFill>
+                        <a:srgbClr val="FFFFFF"/>
+                      </a:solidFill>
+                      <a:prstDash val="solid"/>
+                      <a:round/>
+                      <a:headEnd type="none" w="med" len="med"/>
+                      <a:tailEnd type="none" w="med" len="med"/>
+                    </a:lnB>
+                    <a:solidFill>
+                      <a:srgbClr val="FBF8B9"/>
+                    </a:solidFill>
+                  </a:tcPr>
+                </a:tc>
+                <a:tc>
+                  <a:txBody>
+                    <a:bodyPr/>
+                    <a:lstStyle/>
+                    <a:p>
+                      <a:r>
+                        <a:rPr lang="en-US" sz="1000"/>
+                        <a:t>78.2</a:t>
+                      </a:r>
+                    </a:p>
+                  </a:txBody>
+                  <a:tcPr>
+                    <a:lnL>
+                      <a:noFill/>
+                    </a:lnL>
+                    <a:lnR w="25400" cmpd="sng" algn="ctr" cap="flat">
+                      <a:solidFill>
+                        <a:srgbClr val="FFFFFF"/>
+                      </a:solidFill>
+                      <a:prstDash val="solid"/>
+                      <a:round/>
+                      <a:headEnd type="none" w="med" len="med"/>
+                      <a:tailEnd type="none" w="med" len="med"/>
+                    </a:lnR>
+                    <a:lnT>
+                      <a:noFill/>
+                    </a:lnT>
+                    <a:lnB w="12700" cmpd="sng" algn="ctr" cap="flat">
+                      <a:solidFill>
+                        <a:srgbClr val="FFFFFF"/>
+                      </a:solidFill>
+                      <a:prstDash val="solid"/>
+                      <a:round/>
+                      <a:headEnd type="none" w="med" len="med"/>
+                      <a:tailEnd type="none" w="med" len="med"/>
+                    </a:lnB>
+                    <a:solidFill>
+                      <a:srgbClr val="FBF8B9"/>
+                    </a:solidFill>
+                  </a:tcPr>
+                </a:tc>
+              </a:tr>
+              <a:tr h="190500">
+                <a:tc>
+                  <a:txBody>
+                    <a:bodyPr/>
+                    <a:lstStyle/>
+                    <a:p>
+                      <a:r>
+                        <a:rPr lang="en-US" sz="1000" b="true"/>
+                        <a:t>90</a:t>
+                      </a:r>
+                      <a:r>
+                        <a:rPr lang="en-US" sz="1000"/>
+                        <a:t> CONTROLS</a:t>
+                      </a:r>
+                      <a:br>
+                        <a:rPr lang="en-US" sz="1000"/>
+                      </a:br>
+                    </a:p>
+                  </a:txBody>
+                  <a:tcPr>
+                    <a:lnL>
+                      <a:noFill/>
+                    </a:lnL>
+                    <a:lnR w="25400" cmpd="sng" algn="ctr" cap="flat">
+                      <a:solidFill>
+                        <a:srgbClr val="FFFFFF"/>
+                      </a:solidFill>
+                      <a:prstDash val="solid"/>
+                      <a:round/>
+                      <a:headEnd type="none" w="med" len="med"/>
+                      <a:tailEnd type="none" w="med" len="med"/>
+                    </a:lnR>
+                    <a:lnT>
+                      <a:noFill/>
+                    </a:lnT>
+                    <a:lnB w="19050" cmpd="sng" algn="ctr" cap="flat">
+                      <a:solidFill>
+                        <a:srgbClr val="FFFFFF"/>
+                      </a:solidFill>
+                      <a:prstDash val="solid"/>
+                      <a:round/>
+                      <a:headEnd type="none" w="med" len="med"/>
+                      <a:tailEnd type="none" w="med" len="med"/>
+                    </a:lnB>
+                    <a:solidFill>
+                      <a:srgbClr val="FBF8B9"/>
+                    </a:solidFill>
+                  </a:tcPr>
+                </a:tc>
+                <a:tc>
+                  <a:txBody>
+                    <a:bodyPr/>
+                    <a:lstStyle/>
+                    <a:p>
+                      <a:r>
+                        <a:rPr lang="en-US" sz="1000"/>
+                        <a:t>99</a:t>
+                      </a:r>
+                    </a:p>
+                  </a:txBody>
+                  <a:tcPr>
+                    <a:lnL>
+                      <a:noFill/>
+                    </a:lnL>
+                    <a:lnR w="25400" cmpd="sng" algn="ctr" cap="flat">
+                      <a:solidFill>
+                        <a:srgbClr val="FFFFFF"/>
+                      </a:solidFill>
+                      <a:prstDash val="solid"/>
+                      <a:round/>
+                      <a:headEnd type="none" w="med" len="med"/>
+                      <a:tailEnd type="none" w="med" len="med"/>
+                    </a:lnR>
+                    <a:lnT>
+                      <a:noFill/>
+                    </a:lnT>
+                    <a:lnB w="12700" cmpd="sng" algn="ctr" cap="flat">
+                      <a:solidFill>
+                        <a:srgbClr val="FFFFFF"/>
+                      </a:solidFill>
+                      <a:prstDash val="solid"/>
+                      <a:round/>
+                      <a:headEnd type="none" w="med" len="med"/>
+                      <a:tailEnd type="none" w="med" len="med"/>
+                    </a:lnB>
+                    <a:solidFill>
+                      <a:srgbClr val="FBF8B9"/>
+                    </a:solidFill>
+                  </a:tcPr>
+                </a:tc>
+                <a:tc>
+                  <a:txBody>
+                    <a:bodyPr/>
+                    <a:lstStyle/>
+                    <a:p>
+                      <a:r>
+                        <a:rPr lang="en-US" sz="1000"/>
+                        <a:t>78.2</a:t>
+                      </a:r>
+                    </a:p>
+                  </a:txBody>
+                  <a:tcPr>
+                    <a:lnL>
+                      <a:noFill/>
+                    </a:lnL>
+                    <a:lnR w="25400" cmpd="sng" algn="ctr" cap="flat">
+                      <a:solidFill>
+                        <a:srgbClr val="FFFFFF"/>
+                      </a:solidFill>
+                      <a:prstDash val="solid"/>
+                      <a:round/>
+                      <a:headEnd type="none" w="med" len="med"/>
+                      <a:tailEnd type="none" w="med" len="med"/>
+                    </a:lnR>
+                    <a:lnT>
+                      <a:noFill/>
+                    </a:lnT>
+                    <a:lnB w="12700" cmpd="sng" algn="ctr" cap="flat">
+                      <a:solidFill>
+                        <a:srgbClr val="FFFFFF"/>
+                      </a:solidFill>
+                      <a:prstDash val="solid"/>
+                      <a:round/>
+                      <a:headEnd type="none" w="med" len="med"/>
+                      <a:tailEnd type="none" w="med" len="med"/>
+                    </a:lnB>
+                    <a:solidFill>
+                      <a:srgbClr val="FBF8B9"/>
+                    </a:solidFill>
+                  </a:tcPr>
+                </a:tc>
+              </a:tr>
+            </a:tbl>
+          </a:graphicData>
+        </a:graphic>
+      </p:graphicFrame>
     </p:spTree>
   </p:cSld>
   <p:clrMapOvr>

</xml_diff>